<commit_message>
Update Operational Data Store.pptx
</commit_message>
<xml_diff>
--- a/Presentations/Operational Data Store.pptx
+++ b/Presentations/Operational Data Store.pptx
@@ -249,7 +249,7 @@
           <a:p>
             <a:fld id="{0E7EDDD3-6B36-9445-8F0F-97D1483EF8A5}" type="datetimeFigureOut">
               <a:rPr lang="en-US" smtClean="0"/>
-              <a:t>9/30/2019</a:t>
+              <a:t>10/6/2020</a:t>
             </a:fld>
             <a:endParaRPr lang="en-US"/>
           </a:p>
@@ -417,7 +417,7 @@
           <a:p>
             <a:fld id="{0E7EDDD3-6B36-9445-8F0F-97D1483EF8A5}" type="datetimeFigureOut">
               <a:rPr lang="en-US" smtClean="0"/>
-              <a:t>9/30/2019</a:t>
+              <a:t>10/6/2020</a:t>
             </a:fld>
             <a:endParaRPr lang="en-US"/>
           </a:p>
@@ -595,7 +595,7 @@
           <a:p>
             <a:fld id="{0E7EDDD3-6B36-9445-8F0F-97D1483EF8A5}" type="datetimeFigureOut">
               <a:rPr lang="en-US" smtClean="0"/>
-              <a:t>9/30/2019</a:t>
+              <a:t>10/6/2020</a:t>
             </a:fld>
             <a:endParaRPr lang="en-US"/>
           </a:p>
@@ -763,7 +763,7 @@
           <a:p>
             <a:fld id="{0E7EDDD3-6B36-9445-8F0F-97D1483EF8A5}" type="datetimeFigureOut">
               <a:rPr lang="en-US" smtClean="0"/>
-              <a:t>9/30/2019</a:t>
+              <a:t>10/6/2020</a:t>
             </a:fld>
             <a:endParaRPr lang="en-US"/>
           </a:p>
@@ -1008,7 +1008,7 @@
           <a:p>
             <a:fld id="{0E7EDDD3-6B36-9445-8F0F-97D1483EF8A5}" type="datetimeFigureOut">
               <a:rPr lang="en-US" smtClean="0"/>
-              <a:t>9/30/2019</a:t>
+              <a:t>10/6/2020</a:t>
             </a:fld>
             <a:endParaRPr lang="en-US"/>
           </a:p>
@@ -1237,7 +1237,7 @@
           <a:p>
             <a:fld id="{0E7EDDD3-6B36-9445-8F0F-97D1483EF8A5}" type="datetimeFigureOut">
               <a:rPr lang="en-US" smtClean="0"/>
-              <a:t>9/30/2019</a:t>
+              <a:t>10/6/2020</a:t>
             </a:fld>
             <a:endParaRPr lang="en-US"/>
           </a:p>
@@ -1601,7 +1601,7 @@
           <a:p>
             <a:fld id="{0E7EDDD3-6B36-9445-8F0F-97D1483EF8A5}" type="datetimeFigureOut">
               <a:rPr lang="en-US" smtClean="0"/>
-              <a:t>9/30/2019</a:t>
+              <a:t>10/6/2020</a:t>
             </a:fld>
             <a:endParaRPr lang="en-US"/>
           </a:p>
@@ -1718,7 +1718,7 @@
           <a:p>
             <a:fld id="{0E7EDDD3-6B36-9445-8F0F-97D1483EF8A5}" type="datetimeFigureOut">
               <a:rPr lang="en-US" smtClean="0"/>
-              <a:t>9/30/2019</a:t>
+              <a:t>10/6/2020</a:t>
             </a:fld>
             <a:endParaRPr lang="en-US"/>
           </a:p>
@@ -1813,7 +1813,7 @@
           <a:p>
             <a:fld id="{0E7EDDD3-6B36-9445-8F0F-97D1483EF8A5}" type="datetimeFigureOut">
               <a:rPr lang="en-US" smtClean="0"/>
-              <a:t>9/30/2019</a:t>
+              <a:t>10/6/2020</a:t>
             </a:fld>
             <a:endParaRPr lang="en-US"/>
           </a:p>
@@ -2088,7 +2088,7 @@
           <a:p>
             <a:fld id="{0E7EDDD3-6B36-9445-8F0F-97D1483EF8A5}" type="datetimeFigureOut">
               <a:rPr lang="en-US" smtClean="0"/>
-              <a:t>9/30/2019</a:t>
+              <a:t>10/6/2020</a:t>
             </a:fld>
             <a:endParaRPr lang="en-US"/>
           </a:p>
@@ -2340,7 +2340,7 @@
           <a:p>
             <a:fld id="{0E7EDDD3-6B36-9445-8F0F-97D1483EF8A5}" type="datetimeFigureOut">
               <a:rPr lang="en-US" smtClean="0"/>
-              <a:t>9/30/2019</a:t>
+              <a:t>10/6/2020</a:t>
             </a:fld>
             <a:endParaRPr lang="en-US"/>
           </a:p>
@@ -2551,7 +2551,7 @@
           <a:p>
             <a:fld id="{0E7EDDD3-6B36-9445-8F0F-97D1483EF8A5}" type="datetimeFigureOut">
               <a:rPr lang="en-US" smtClean="0"/>
-              <a:t>9/30/2019</a:t>
+              <a:t>10/6/2020</a:t>
             </a:fld>
             <a:endParaRPr lang="en-US"/>
           </a:p>
@@ -3192,7 +3192,7 @@
                   <a:srgbClr val="FFFFFF"/>
                 </a:solidFill>
               </a:rPr>
-              <a:t>Data 742 10/1/2019</a:t>
+              <a:t>Data 742 10/6/2020</a:t>
             </a:r>
           </a:p>
         </p:txBody>

</xml_diff>